<commit_message>
slide algoritmos corrigido closes #53
</commit_message>
<xml_diff>
--- a/1º semestre/Revisões by danny/2º bimestre/Revisão - Arquitetura e organização de computadores.pptx
+++ b/1º semestre/Revisões by danny/2º bimestre/Revisão - Arquitetura e organização de computadores.pptx
@@ -4289,12 +4289,8 @@
           <a:lstStyle/>
           <a:p>
             <a:r>
-              <a:rPr lang="pt-BR" dirty="0" err="1"/>
-              <a:t>Caracteristicas</a:t>
-            </a:r>
-            <a:r>
-              <a:rPr lang="pt-BR" dirty="0"/>
-              <a:t>:</a:t>
+              <a:rPr lang="pt-BR" dirty="0"/>
+              <a:t>Características:</a:t>
             </a:r>
           </a:p>
         </p:txBody>

</xml_diff>